<commit_message>
added script to create galapagos map
</commit_message>
<xml_diff>
--- a/f_other/causal_diagram.pptx
+++ b/f_other/causal_diagram.pptx
@@ -243,7 +243,7 @@
           <a:p>
             <a:fld id="{A5E71915-4E7E-4A78-9D4B-6170BE2E1D8C}" type="datetimeFigureOut">
               <a:rPr lang="en-US" smtClean="0"/>
-              <a:t>6/25/2024</a:t>
+              <a:t>7/16/2024</a:t>
             </a:fld>
             <a:endParaRPr lang="en-US"/>
           </a:p>
@@ -413,7 +413,7 @@
           <a:p>
             <a:fld id="{A5E71915-4E7E-4A78-9D4B-6170BE2E1D8C}" type="datetimeFigureOut">
               <a:rPr lang="en-US" smtClean="0"/>
-              <a:t>6/25/2024</a:t>
+              <a:t>7/16/2024</a:t>
             </a:fld>
             <a:endParaRPr lang="en-US"/>
           </a:p>
@@ -593,7 +593,7 @@
           <a:p>
             <a:fld id="{A5E71915-4E7E-4A78-9D4B-6170BE2E1D8C}" type="datetimeFigureOut">
               <a:rPr lang="en-US" smtClean="0"/>
-              <a:t>6/25/2024</a:t>
+              <a:t>7/16/2024</a:t>
             </a:fld>
             <a:endParaRPr lang="en-US"/>
           </a:p>
@@ -763,7 +763,7 @@
           <a:p>
             <a:fld id="{A5E71915-4E7E-4A78-9D4B-6170BE2E1D8C}" type="datetimeFigureOut">
               <a:rPr lang="en-US" smtClean="0"/>
-              <a:t>6/25/2024</a:t>
+              <a:t>7/16/2024</a:t>
             </a:fld>
             <a:endParaRPr lang="en-US"/>
           </a:p>
@@ -1009,7 +1009,7 @@
           <a:p>
             <a:fld id="{A5E71915-4E7E-4A78-9D4B-6170BE2E1D8C}" type="datetimeFigureOut">
               <a:rPr lang="en-US" smtClean="0"/>
-              <a:t>6/25/2024</a:t>
+              <a:t>7/16/2024</a:t>
             </a:fld>
             <a:endParaRPr lang="en-US"/>
           </a:p>
@@ -1241,7 +1241,7 @@
           <a:p>
             <a:fld id="{A5E71915-4E7E-4A78-9D4B-6170BE2E1D8C}" type="datetimeFigureOut">
               <a:rPr lang="en-US" smtClean="0"/>
-              <a:t>6/25/2024</a:t>
+              <a:t>7/16/2024</a:t>
             </a:fld>
             <a:endParaRPr lang="en-US"/>
           </a:p>
@@ -1608,7 +1608,7 @@
           <a:p>
             <a:fld id="{A5E71915-4E7E-4A78-9D4B-6170BE2E1D8C}" type="datetimeFigureOut">
               <a:rPr lang="en-US" smtClean="0"/>
-              <a:t>6/25/2024</a:t>
+              <a:t>7/16/2024</a:t>
             </a:fld>
             <a:endParaRPr lang="en-US"/>
           </a:p>
@@ -1726,7 +1726,7 @@
           <a:p>
             <a:fld id="{A5E71915-4E7E-4A78-9D4B-6170BE2E1D8C}" type="datetimeFigureOut">
               <a:rPr lang="en-US" smtClean="0"/>
-              <a:t>6/25/2024</a:t>
+              <a:t>7/16/2024</a:t>
             </a:fld>
             <a:endParaRPr lang="en-US"/>
           </a:p>
@@ -1821,7 +1821,7 @@
           <a:p>
             <a:fld id="{A5E71915-4E7E-4A78-9D4B-6170BE2E1D8C}" type="datetimeFigureOut">
               <a:rPr lang="en-US" smtClean="0"/>
-              <a:t>6/25/2024</a:t>
+              <a:t>7/16/2024</a:t>
             </a:fld>
             <a:endParaRPr lang="en-US"/>
           </a:p>
@@ -2098,7 +2098,7 @@
           <a:p>
             <a:fld id="{A5E71915-4E7E-4A78-9D4B-6170BE2E1D8C}" type="datetimeFigureOut">
               <a:rPr lang="en-US" smtClean="0"/>
-              <a:t>6/25/2024</a:t>
+              <a:t>7/16/2024</a:t>
             </a:fld>
             <a:endParaRPr lang="en-US"/>
           </a:p>
@@ -2351,7 +2351,7 @@
           <a:p>
             <a:fld id="{A5E71915-4E7E-4A78-9D4B-6170BE2E1D8C}" type="datetimeFigureOut">
               <a:rPr lang="en-US" smtClean="0"/>
-              <a:t>6/25/2024</a:t>
+              <a:t>7/16/2024</a:t>
             </a:fld>
             <a:endParaRPr lang="en-US"/>
           </a:p>
@@ -2564,7 +2564,7 @@
           <a:p>
             <a:fld id="{A5E71915-4E7E-4A78-9D4B-6170BE2E1D8C}" type="datetimeFigureOut">
               <a:rPr lang="en-US" smtClean="0"/>
-              <a:t>6/25/2024</a:t>
+              <a:t>7/16/2024</a:t>
             </a:fld>
             <a:endParaRPr lang="en-US"/>
           </a:p>
@@ -3405,8 +3405,9 @@
           </a:prstGeom>
           <a:ln>
             <a:solidFill>
-              <a:srgbClr val="FF0000"/>
+              <a:schemeClr val="tx1"/>
             </a:solidFill>
+            <a:prstDash val="dash"/>
             <a:tailEnd type="triangle"/>
           </a:ln>
         </p:spPr>
@@ -4538,43 +4539,21 @@
                 <a:latin typeface="Times New Roman" panose="02020603050405020304" pitchFamily="18" charset="0"/>
                 <a:cs typeface="Times New Roman" panose="02020603050405020304" pitchFamily="18" charset="0"/>
               </a:rPr>
-              <a:t>Higher sun exposure</a:t>
-            </a:r>
+              <a:t>Higher sun exposure*~</a:t>
+            </a:r>
+          </a:p>
+          <a:p>
+            <a:pPr marL="228600" indent="-228600">
+              <a:buFontTx/>
+              <a:buAutoNum type="arabicParenBoth"/>
+            </a:pPr>
             <a:r>
               <a:rPr lang="en-US" sz="1200" dirty="0" smtClean="0">
                 <a:latin typeface="Times New Roman" panose="02020603050405020304" pitchFamily="18" charset="0"/>
                 <a:cs typeface="Times New Roman" panose="02020603050405020304" pitchFamily="18" charset="0"/>
               </a:rPr>
-              <a:t>*~</a:t>
-            </a:r>
-            <a:endParaRPr lang="en-US" sz="1200" dirty="0" smtClean="0">
-              <a:latin typeface="Times New Roman" panose="02020603050405020304" pitchFamily="18" charset="0"/>
-              <a:cs typeface="Times New Roman" panose="02020603050405020304" pitchFamily="18" charset="0"/>
-            </a:endParaRPr>
-          </a:p>
-          <a:p>
-            <a:pPr marL="228600" indent="-228600">
-              <a:buFontTx/>
-              <a:buAutoNum type="arabicParenBoth"/>
-            </a:pPr>
-            <a:r>
-              <a:rPr lang="en-US" sz="1200" dirty="0" smtClean="0">
-                <a:latin typeface="Times New Roman" panose="02020603050405020304" pitchFamily="18" charset="0"/>
-                <a:cs typeface="Times New Roman" panose="02020603050405020304" pitchFamily="18" charset="0"/>
-              </a:rPr>
-              <a:t>Escape soil nematodes</a:t>
-            </a:r>
-            <a:r>
-              <a:rPr lang="en-US" sz="1200" dirty="0" smtClean="0">
-                <a:latin typeface="Times New Roman" panose="02020603050405020304" pitchFamily="18" charset="0"/>
-                <a:cs typeface="Times New Roman" panose="02020603050405020304" pitchFamily="18" charset="0"/>
-              </a:rPr>
-              <a:t>*</a:t>
-            </a:r>
-            <a:endParaRPr lang="en-US" sz="1200" dirty="0" smtClean="0">
-              <a:latin typeface="Times New Roman" panose="02020603050405020304" pitchFamily="18" charset="0"/>
-              <a:cs typeface="Times New Roman" panose="02020603050405020304" pitchFamily="18" charset="0"/>
-            </a:endParaRPr>
+              <a:t>Escape soil nematodes*</a:t>
+            </a:r>
           </a:p>
           <a:p>
             <a:pPr marL="228600" indent="-228600">
@@ -4610,19 +4589,8 @@
                 <a:latin typeface="Times New Roman" panose="02020603050405020304" pitchFamily="18" charset="0"/>
                 <a:cs typeface="Times New Roman" panose="02020603050405020304" pitchFamily="18" charset="0"/>
               </a:rPr>
-              <a:t>Higher sun exposure</a:t>
-            </a:r>
-            <a:r>
-              <a:rPr lang="en-US" sz="1200" dirty="0" smtClean="0">
-                <a:latin typeface="Times New Roman" panose="02020603050405020304" pitchFamily="18" charset="0"/>
-                <a:cs typeface="Times New Roman" panose="02020603050405020304" pitchFamily="18" charset="0"/>
-              </a:rPr>
-              <a:t>*~</a:t>
-            </a:r>
-            <a:endParaRPr lang="en-US" sz="1200" dirty="0" smtClean="0">
-              <a:latin typeface="Times New Roman" panose="02020603050405020304" pitchFamily="18" charset="0"/>
-              <a:cs typeface="Times New Roman" panose="02020603050405020304" pitchFamily="18" charset="0"/>
-            </a:endParaRPr>
+              <a:t>Higher sun exposure*~</a:t>
+            </a:r>
           </a:p>
           <a:p>
             <a:pPr marL="228600" indent="-228600">
@@ -4645,14 +4613,7 @@
                 <a:latin typeface="Times New Roman" panose="02020603050405020304" pitchFamily="18" charset="0"/>
                 <a:cs typeface="Times New Roman" panose="02020603050405020304" pitchFamily="18" charset="0"/>
               </a:rPr>
-              <a:t>Higher </a:t>
-            </a:r>
-            <a:r>
-              <a:rPr lang="en-US" sz="1200" dirty="0" smtClean="0">
-                <a:latin typeface="Times New Roman" panose="02020603050405020304" pitchFamily="18" charset="0"/>
-                <a:cs typeface="Times New Roman" panose="02020603050405020304" pitchFamily="18" charset="0"/>
-              </a:rPr>
-              <a:t>foraging activities and sun exposure~</a:t>
+              <a:t>Higher foraging activities and sun exposure~</a:t>
             </a:r>
           </a:p>
           <a:p>

</xml_diff>